<commit_message>
add results for paper
</commit_message>
<xml_diff>
--- a/Paper/figures/figures_9_10/EEG_project_9_10_results.pptx
+++ b/Paper/figures/figures_9_10/EEG_project_9_10_results.pptx
@@ -5,7 +5,7 @@
     <p:sldMasterId id="2147483756" r:id="rId1"/>
   </p:sldMasterIdLst>
   <p:notesMasterIdLst>
-    <p:notesMasterId r:id="rId17"/>
+    <p:notesMasterId r:id="rId18"/>
   </p:notesMasterIdLst>
   <p:sldIdLst>
     <p:sldId id="302" r:id="rId2"/>
@@ -20,9 +20,10 @@
     <p:sldId id="315" r:id="rId11"/>
     <p:sldId id="314" r:id="rId12"/>
     <p:sldId id="311" r:id="rId13"/>
-    <p:sldId id="313" r:id="rId14"/>
-    <p:sldId id="312" r:id="rId15"/>
-    <p:sldId id="309" r:id="rId16"/>
+    <p:sldId id="317" r:id="rId14"/>
+    <p:sldId id="313" r:id="rId15"/>
+    <p:sldId id="312" r:id="rId16"/>
+    <p:sldId id="309" r:id="rId17"/>
   </p:sldIdLst>
   <p:sldSz cx="11522075" cy="6858000"/>
   <p:notesSz cx="6858000" cy="9144000"/>
@@ -206,7 +207,7 @@
           <a:p>
             <a:fld id="{2D438DE5-3A01-4A96-B6BE-6C3D35906B44}" type="datetimeFigureOut">
               <a:rPr lang="he-IL" smtClean="0"/>
-              <a:t>ל'/תשרי/תשע"ט</a:t>
+              <a:t>א'/חשון/תשע"ט</a:t>
             </a:fld>
             <a:endParaRPr lang="he-IL"/>
           </a:p>
@@ -1132,7 +1133,7 @@
           <a:p>
             <a:fld id="{815FDF4E-02FA-495D-9F7F-218675B6E325}" type="datetimeFigureOut">
               <a:rPr lang="he-IL" smtClean="0"/>
-              <a:t>ל'/תשרי/תשע"ט</a:t>
+              <a:t>א'/חשון/תשע"ט</a:t>
             </a:fld>
             <a:endParaRPr lang="he-IL"/>
           </a:p>
@@ -1315,7 +1316,7 @@
           <a:p>
             <a:fld id="{815FDF4E-02FA-495D-9F7F-218675B6E325}" type="datetimeFigureOut">
               <a:rPr lang="he-IL" smtClean="0"/>
-              <a:t>ל'/תשרי/תשע"ט</a:t>
+              <a:t>א'/חשון/תשע"ט</a:t>
             </a:fld>
             <a:endParaRPr lang="he-IL"/>
           </a:p>
@@ -1490,7 +1491,7 @@
           <a:p>
             <a:fld id="{815FDF4E-02FA-495D-9F7F-218675B6E325}" type="datetimeFigureOut">
               <a:rPr lang="he-IL" smtClean="0"/>
-              <a:t>ל'/תשרי/תשע"ט</a:t>
+              <a:t>א'/חשון/תשע"ט</a:t>
             </a:fld>
             <a:endParaRPr lang="he-IL"/>
           </a:p>
@@ -1655,7 +1656,7 @@
           <a:p>
             <a:fld id="{815FDF4E-02FA-495D-9F7F-218675B6E325}" type="datetimeFigureOut">
               <a:rPr lang="he-IL" smtClean="0"/>
-              <a:t>ל'/תשרי/תשע"ט</a:t>
+              <a:t>א'/חשון/תשע"ט</a:t>
             </a:fld>
             <a:endParaRPr lang="he-IL"/>
           </a:p>
@@ -1876,7 +1877,7 @@
           <a:p>
             <a:fld id="{815FDF4E-02FA-495D-9F7F-218675B6E325}" type="datetimeFigureOut">
               <a:rPr lang="he-IL" smtClean="0"/>
-              <a:t>ל'/תשרי/תשע"ט</a:t>
+              <a:t>א'/חשון/תשע"ט</a:t>
             </a:fld>
             <a:endParaRPr lang="he-IL"/>
           </a:p>
@@ -2135,7 +2136,7 @@
           <a:p>
             <a:fld id="{815FDF4E-02FA-495D-9F7F-218675B6E325}" type="datetimeFigureOut">
               <a:rPr lang="he-IL" smtClean="0"/>
-              <a:t>ל'/תשרי/תשע"ט</a:t>
+              <a:t>א'/חשון/תשע"ט</a:t>
             </a:fld>
             <a:endParaRPr lang="he-IL"/>
           </a:p>
@@ -2539,7 +2540,7 @@
           <a:p>
             <a:fld id="{815FDF4E-02FA-495D-9F7F-218675B6E325}" type="datetimeFigureOut">
               <a:rPr lang="he-IL" smtClean="0"/>
-              <a:t>ל'/תשרי/תשע"ט</a:t>
+              <a:t>א'/חשון/תשע"ט</a:t>
             </a:fld>
             <a:endParaRPr lang="he-IL"/>
           </a:p>
@@ -2670,7 +2671,7 @@
           <a:p>
             <a:fld id="{815FDF4E-02FA-495D-9F7F-218675B6E325}" type="datetimeFigureOut">
               <a:rPr lang="he-IL" smtClean="0"/>
-              <a:t>ל'/תשרי/תשע"ט</a:t>
+              <a:t>א'/חשון/תשע"ט</a:t>
             </a:fld>
             <a:endParaRPr lang="he-IL"/>
           </a:p>
@@ -2770,7 +2771,7 @@
           <a:p>
             <a:fld id="{815FDF4E-02FA-495D-9F7F-218675B6E325}" type="datetimeFigureOut">
               <a:rPr lang="he-IL" smtClean="0"/>
-              <a:t>ל'/תשרי/תשע"ט</a:t>
+              <a:t>א'/חשון/תשע"ט</a:t>
             </a:fld>
             <a:endParaRPr lang="he-IL"/>
           </a:p>
@@ -3015,7 +3016,7 @@
           <a:p>
             <a:fld id="{815FDF4E-02FA-495D-9F7F-218675B6E325}" type="datetimeFigureOut">
               <a:rPr lang="he-IL" smtClean="0"/>
-              <a:t>ל'/תשרי/תשע"ט</a:t>
+              <a:t>א'/חשון/תשע"ט</a:t>
             </a:fld>
             <a:endParaRPr lang="he-IL"/>
           </a:p>
@@ -3259,7 +3260,7 @@
           <a:p>
             <a:fld id="{815FDF4E-02FA-495D-9F7F-218675B6E325}" type="datetimeFigureOut">
               <a:rPr lang="he-IL" smtClean="0"/>
-              <a:t>ל'/תשרי/תשע"ט</a:t>
+              <a:t>א'/חשון/תשע"ט</a:t>
             </a:fld>
             <a:endParaRPr lang="he-IL"/>
           </a:p>
@@ -4083,7 +4084,7 @@
           <a:p>
             <a:fld id="{815FDF4E-02FA-495D-9F7F-218675B6E325}" type="datetimeFigureOut">
               <a:rPr lang="he-IL" smtClean="0"/>
-              <a:t>ל'/תשרי/תשע"ט</a:t>
+              <a:t>א'/חשון/תשע"ט</a:t>
             </a:fld>
             <a:endParaRPr lang="he-IL"/>
           </a:p>
@@ -5091,6 +5092,131 @@
           <a:chExt cx="0" cy="0"/>
         </a:xfrm>
       </p:grpSpPr>
+      <p:pic>
+        <p:nvPicPr>
+          <p:cNvPr id="1026" name="Picture 2"/>
+          <p:cNvPicPr>
+            <a:picLocks noChangeAspect="1" noChangeArrowheads="1"/>
+          </p:cNvPicPr>
+          <p:nvPr/>
+        </p:nvPicPr>
+        <p:blipFill>
+          <a:blip r:embed="rId2">
+            <a:extLst>
+              <a:ext uri="{28A0092B-C50C-407E-A947-70E740481C1C}">
+                <a14:useLocalDpi xmlns:a14="http://schemas.microsoft.com/office/drawing/2010/main" val="0"/>
+              </a:ext>
+            </a:extLst>
+          </a:blip>
+          <a:srcRect/>
+          <a:stretch>
+            <a:fillRect/>
+          </a:stretch>
+        </p:blipFill>
+        <p:spPr bwMode="auto">
+          <a:xfrm>
+            <a:off x="1080517" y="2132856"/>
+            <a:ext cx="9505056" cy="4529754"/>
+          </a:xfrm>
+          <a:prstGeom prst="rect">
+            <a:avLst/>
+          </a:prstGeom>
+          <a:noFill/>
+          <a:ln>
+            <a:noFill/>
+          </a:ln>
+          <a:effectLst/>
+          <a:extLst>
+            <a:ext uri="{909E8E84-426E-40DD-AFC4-6F175D3DCCD1}">
+              <a14:hiddenFill xmlns:a14="http://schemas.microsoft.com/office/drawing/2010/main">
+                <a:solidFill>
+                  <a:schemeClr val="accent1"/>
+                </a:solidFill>
+              </a14:hiddenFill>
+            </a:ext>
+            <a:ext uri="{91240B29-F687-4F45-9708-019B960494DF}">
+              <a14:hiddenLine xmlns:a14="http://schemas.microsoft.com/office/drawing/2010/main" w="9525">
+                <a:solidFill>
+                  <a:schemeClr val="tx1"/>
+                </a:solidFill>
+                <a:miter lim="800000"/>
+                <a:headEnd/>
+                <a:tailEnd/>
+              </a14:hiddenLine>
+            </a:ext>
+            <a:ext uri="{AF507438-7753-43E0-B8FC-AC1667EBCBE1}">
+              <a14:hiddenEffects xmlns:a14="http://schemas.microsoft.com/office/drawing/2010/main">
+                <a:effectLst>
+                  <a:outerShdw dist="35921" dir="2700000" algn="ctr" rotWithShape="0">
+                    <a:schemeClr val="bg2"/>
+                  </a:outerShdw>
+                </a:effectLst>
+              </a14:hiddenEffects>
+            </a:ext>
+          </a:extLst>
+        </p:spPr>
+      </p:pic>
+      <p:sp>
+        <p:nvSpPr>
+          <p:cNvPr id="2" name="TextBox 1"/>
+          <p:cNvSpPr txBox="1"/>
+          <p:nvPr/>
+        </p:nvSpPr>
+        <p:spPr>
+          <a:xfrm>
+            <a:off x="1368549" y="1196752"/>
+            <a:ext cx="4464496" cy="369332"/>
+          </a:xfrm>
+          <a:prstGeom prst="rect">
+            <a:avLst/>
+          </a:prstGeom>
+          <a:noFill/>
+        </p:spPr>
+        <p:txBody>
+          <a:bodyPr wrap="square" rtlCol="1">
+            <a:spAutoFit/>
+          </a:bodyPr>
+          <a:lstStyle/>
+          <a:p>
+            <a:pPr algn="l" rtl="0"/>
+            <a:r>
+              <a:rPr lang="en-US" dirty="0" smtClean="0"/>
+              <a:t>eigenvalues</a:t>
+            </a:r>
+            <a:endParaRPr lang="he-IL" dirty="0"/>
+          </a:p>
+        </p:txBody>
+      </p:sp>
+    </p:spTree>
+    <p:extLst>
+      <p:ext uri="{BB962C8B-B14F-4D97-AF65-F5344CB8AC3E}">
+        <p14:creationId xmlns:p14="http://schemas.microsoft.com/office/powerpoint/2010/main" val="1192786956"/>
+      </p:ext>
+    </p:extLst>
+  </p:cSld>
+  <p:clrMapOvr>
+    <a:masterClrMapping/>
+  </p:clrMapOvr>
+</p:sld>
+</file>
+
+<file path=ppt/slides/slide14.xml><?xml version="1.0" encoding="utf-8"?>
+<p:sld xmlns:a="http://schemas.openxmlformats.org/drawingml/2006/main" xmlns:r="http://schemas.openxmlformats.org/officeDocument/2006/relationships" xmlns:p="http://schemas.openxmlformats.org/presentationml/2006/main">
+  <p:cSld>
+    <p:spTree>
+      <p:nvGrpSpPr>
+        <p:cNvPr id="1" name=""/>
+        <p:cNvGrpSpPr/>
+        <p:nvPr/>
+      </p:nvGrpSpPr>
+      <p:grpSpPr>
+        <a:xfrm>
+          <a:off x="0" y="0"/>
+          <a:ext cx="0" cy="0"/>
+          <a:chOff x="0" y="0"/>
+          <a:chExt cx="0" cy="0"/>
+        </a:xfrm>
+      </p:grpSpPr>
       <p:sp>
         <p:nvSpPr>
           <p:cNvPr id="2" name="כותרת 1"/>
@@ -5205,7 +5331,7 @@
 </p:sld>
 </file>
 
-<file path=ppt/slides/slide14.xml><?xml version="1.0" encoding="utf-8"?>
+<file path=ppt/slides/slide15.xml><?xml version="1.0" encoding="utf-8"?>
 <p:sld xmlns:a="http://schemas.openxmlformats.org/drawingml/2006/main" xmlns:r="http://schemas.openxmlformats.org/officeDocument/2006/relationships" xmlns:p="http://schemas.openxmlformats.org/presentationml/2006/main">
   <p:cSld>
     <p:spTree>
@@ -5336,7 +5462,7 @@
 </p:sld>
 </file>
 
-<file path=ppt/slides/slide15.xml><?xml version="1.0" encoding="utf-8"?>
+<file path=ppt/slides/slide16.xml><?xml version="1.0" encoding="utf-8"?>
 <p:sld xmlns:a="http://schemas.openxmlformats.org/drawingml/2006/main" xmlns:r="http://schemas.openxmlformats.org/officeDocument/2006/relationships" xmlns:p="http://schemas.openxmlformats.org/presentationml/2006/main">
   <p:cSld>
     <p:spTree>

</xml_diff>